<commit_message>
Updated DB schema and user stories #17 #18
</commit_message>
<xml_diff>
--- a/front-end/MockupSimpleDesign.pptx
+++ b/front-end/MockupSimpleDesign.pptx
@@ -5,12 +5,13 @@
     <p:sldMasterId id="2147483660" r:id="rId1"/>
   </p:sldMasterIdLst>
   <p:sldIdLst>
-    <p:sldId id="256" r:id="rId2"/>
-    <p:sldId id="261" r:id="rId3"/>
-    <p:sldId id="257" r:id="rId4"/>
-    <p:sldId id="262" r:id="rId5"/>
-    <p:sldId id="259" r:id="rId6"/>
-    <p:sldId id="263" r:id="rId7"/>
+    <p:sldId id="264" r:id="rId2"/>
+    <p:sldId id="256" r:id="rId3"/>
+    <p:sldId id="261" r:id="rId4"/>
+    <p:sldId id="257" r:id="rId5"/>
+    <p:sldId id="262" r:id="rId6"/>
+    <p:sldId id="259" r:id="rId7"/>
+    <p:sldId id="263" r:id="rId8"/>
   </p:sldIdLst>
   <p:sldSz cx="12192000" cy="6858000"/>
   <p:notesSz cx="6858000" cy="9144000"/>
@@ -126,7 +127,7 @@
 <file path=ppt/revisionInfo.xml><?xml version="1.0" encoding="utf-8"?>
 <p1510:revInfo xmlns:a="http://schemas.openxmlformats.org/drawingml/2006/main" xmlns:r="http://schemas.openxmlformats.org/officeDocument/2006/relationships" xmlns:p1510="http://schemas.microsoft.com/office/powerpoint/2015/10/main">
   <p1510:revLst>
-    <p1510:client id="{D4F8EDFF-8D22-436F-92E2-C640653DB82F}" v="64" dt="2023-10-12T17:26:48.783"/>
+    <p1510:client id="{D4F8EDFF-8D22-436F-92E2-C640653DB82F}" v="68" dt="2023-10-12T18:12:45.622"/>
   </p1510:revLst>
 </p1510:revInfo>
 </file>
@@ -136,7 +137,7 @@
   <pc:docChgLst>
     <pc:chgData name="Maldonado, Daniel" userId="208bc5cf-4c7f-40de-aa5f-36b84b85f9f4" providerId="ADAL" clId="{D4F8EDFF-8D22-436F-92E2-C640653DB82F}"/>
     <pc:docChg chg="undo custSel addSld delSld modSld sldOrd">
-      <pc:chgData name="Maldonado, Daniel" userId="208bc5cf-4c7f-40de-aa5f-36b84b85f9f4" providerId="ADAL" clId="{D4F8EDFF-8D22-436F-92E2-C640653DB82F}" dt="2023-10-12T17:30:04.966" v="1207" actId="20577"/>
+      <pc:chgData name="Maldonado, Daniel" userId="208bc5cf-4c7f-40de-aa5f-36b84b85f9f4" providerId="ADAL" clId="{D4F8EDFF-8D22-436F-92E2-C640653DB82F}" dt="2023-10-12T18:30:30.135" v="1335" actId="20577"/>
       <pc:docMkLst>
         <pc:docMk/>
       </pc:docMkLst>
@@ -164,7 +165,7 @@
         </pc:graphicFrameChg>
       </pc:sldChg>
       <pc:sldChg chg="addSp delSp modSp mod">
-        <pc:chgData name="Maldonado, Daniel" userId="208bc5cf-4c7f-40de-aa5f-36b84b85f9f4" providerId="ADAL" clId="{D4F8EDFF-8D22-436F-92E2-C640653DB82F}" dt="2023-10-12T16:57:57.122" v="798" actId="1076"/>
+        <pc:chgData name="Maldonado, Daniel" userId="208bc5cf-4c7f-40de-aa5f-36b84b85f9f4" providerId="ADAL" clId="{D4F8EDFF-8D22-436F-92E2-C640653DB82F}" dt="2023-10-12T18:05:13.945" v="1239" actId="20577"/>
         <pc:sldMkLst>
           <pc:docMk/>
           <pc:sldMk cId="2217030426" sldId="257"/>
@@ -218,7 +219,7 @@
           </ac:spMkLst>
         </pc:spChg>
         <pc:graphicFrameChg chg="modGraphic">
-          <ac:chgData name="Maldonado, Daniel" userId="208bc5cf-4c7f-40de-aa5f-36b84b85f9f4" providerId="ADAL" clId="{D4F8EDFF-8D22-436F-92E2-C640653DB82F}" dt="2023-10-12T16:57:53.284" v="796" actId="2165"/>
+          <ac:chgData name="Maldonado, Daniel" userId="208bc5cf-4c7f-40de-aa5f-36b84b85f9f4" providerId="ADAL" clId="{D4F8EDFF-8D22-436F-92E2-C640653DB82F}" dt="2023-10-12T18:05:13.945" v="1239" actId="20577"/>
           <ac:graphicFrameMkLst>
             <pc:docMk/>
             <pc:sldMk cId="2217030426" sldId="257"/>
@@ -628,8 +629,8 @@
           </p:ext>
         </pc:extLst>
       </pc:sldChg>
-      <pc:sldChg chg="addSp delSp modSp add mod addCm">
-        <pc:chgData name="Maldonado, Daniel" userId="208bc5cf-4c7f-40de-aa5f-36b84b85f9f4" providerId="ADAL" clId="{D4F8EDFF-8D22-436F-92E2-C640653DB82F}" dt="2023-10-12T17:30:04.966" v="1207" actId="20577"/>
+      <pc:sldChg chg="addSp delSp modSp add mod addCm modCm">
+        <pc:chgData name="Maldonado, Daniel" userId="208bc5cf-4c7f-40de-aa5f-36b84b85f9f4" providerId="ADAL" clId="{D4F8EDFF-8D22-436F-92E2-C640653DB82F}" dt="2023-10-12T18:26:40.297" v="1328" actId="20577"/>
         <pc:sldMkLst>
           <pc:docMk/>
           <pc:sldMk cId="3767813412" sldId="259"/>
@@ -915,7 +916,7 @@
           </ac:spMkLst>
         </pc:spChg>
         <pc:spChg chg="add mod">
-          <ac:chgData name="Maldonado, Daniel" userId="208bc5cf-4c7f-40de-aa5f-36b84b85f9f4" providerId="ADAL" clId="{D4F8EDFF-8D22-436F-92E2-C640653DB82F}" dt="2023-10-12T17:30:04.966" v="1207" actId="20577"/>
+          <ac:chgData name="Maldonado, Daniel" userId="208bc5cf-4c7f-40de-aa5f-36b84b85f9f4" providerId="ADAL" clId="{D4F8EDFF-8D22-436F-92E2-C640653DB82F}" dt="2023-10-12T18:26:40.297" v="1328" actId="20577"/>
           <ac:spMkLst>
             <pc:docMk/>
             <pc:sldMk cId="3767813412" sldId="259"/>
@@ -1124,8 +1125,8 @@
         </pc:cxnChg>
         <pc:extLst>
           <p:ext xmlns:p="http://schemas.openxmlformats.org/presentationml/2006/main" uri="{D6D511B9-2390-475A-947B-AFAB55BFBCF1}">
-            <pc226:cmChg xmlns:pc226="http://schemas.microsoft.com/office/powerpoint/2022/06/main/command" chg="add">
-              <pc226:chgData name="Maldonado, Daniel" userId="208bc5cf-4c7f-40de-aa5f-36b84b85f9f4" providerId="ADAL" clId="{D4F8EDFF-8D22-436F-92E2-C640653DB82F}" dt="2023-10-12T16:28:09.904" v="285"/>
+            <pc226:cmChg xmlns:pc226="http://schemas.microsoft.com/office/powerpoint/2022/06/main/command" chg="add mod">
+              <pc226:chgData name="Maldonado, Daniel" userId="208bc5cf-4c7f-40de-aa5f-36b84b85f9f4" providerId="ADAL" clId="{D4F8EDFF-8D22-436F-92E2-C640653DB82F}" dt="2023-10-12T18:10:29.635" v="1250"/>
               <pc2:cmMkLst xmlns:pc2="http://schemas.microsoft.com/office/powerpoint/2019/9/main/command">
                 <pc:docMk/>
                 <pc:sldMk cId="3767813412" sldId="259"/>
@@ -1151,7 +1152,7 @@
         </pc:graphicFrameChg>
       </pc:sldChg>
       <pc:sldChg chg="addSp delSp modSp add mod ord">
-        <pc:chgData name="Maldonado, Daniel" userId="208bc5cf-4c7f-40de-aa5f-36b84b85f9f4" providerId="ADAL" clId="{D4F8EDFF-8D22-436F-92E2-C640653DB82F}" dt="2023-10-12T17:02:55.824" v="841" actId="20577"/>
+        <pc:chgData name="Maldonado, Daniel" userId="208bc5cf-4c7f-40de-aa5f-36b84b85f9f4" providerId="ADAL" clId="{D4F8EDFF-8D22-436F-92E2-C640653DB82F}" dt="2023-10-12T17:47:52.161" v="1212" actId="20577"/>
         <pc:sldMkLst>
           <pc:docMk/>
           <pc:sldMk cId="1281371689" sldId="261"/>
@@ -1197,7 +1198,7 @@
           </ac:spMkLst>
         </pc:spChg>
         <pc:graphicFrameChg chg="modGraphic">
-          <ac:chgData name="Maldonado, Daniel" userId="208bc5cf-4c7f-40de-aa5f-36b84b85f9f4" providerId="ADAL" clId="{D4F8EDFF-8D22-436F-92E2-C640653DB82F}" dt="2023-10-12T16:33:56.204" v="359" actId="20577"/>
+          <ac:chgData name="Maldonado, Daniel" userId="208bc5cf-4c7f-40de-aa5f-36b84b85f9f4" providerId="ADAL" clId="{D4F8EDFF-8D22-436F-92E2-C640653DB82F}" dt="2023-10-12T17:47:52.161" v="1212" actId="20577"/>
           <ac:graphicFrameMkLst>
             <pc:docMk/>
             <pc:sldMk cId="1281371689" sldId="261"/>
@@ -1222,7 +1223,7 @@
         </pc:graphicFrameChg>
       </pc:sldChg>
       <pc:sldChg chg="addSp delSp modSp add mod">
-        <pc:chgData name="Maldonado, Daniel" userId="208bc5cf-4c7f-40de-aa5f-36b84b85f9f4" providerId="ADAL" clId="{D4F8EDFF-8D22-436F-92E2-C640653DB82F}" dt="2023-10-12T17:22:20.359" v="1021"/>
+        <pc:chgData name="Maldonado, Daniel" userId="208bc5cf-4c7f-40de-aa5f-36b84b85f9f4" providerId="ADAL" clId="{D4F8EDFF-8D22-436F-92E2-C640653DB82F}" dt="2023-10-12T18:30:30.135" v="1335" actId="20577"/>
         <pc:sldMkLst>
           <pc:docMk/>
           <pc:sldMk cId="141755162" sldId="262"/>
@@ -1244,7 +1245,7 @@
           </ac:spMkLst>
         </pc:spChg>
         <pc:graphicFrameChg chg="mod modGraphic">
-          <ac:chgData name="Maldonado, Daniel" userId="208bc5cf-4c7f-40de-aa5f-36b84b85f9f4" providerId="ADAL" clId="{D4F8EDFF-8D22-436F-92E2-C640653DB82F}" dt="2023-10-12T16:57:41.451" v="794"/>
+          <ac:chgData name="Maldonado, Daniel" userId="208bc5cf-4c7f-40de-aa5f-36b84b85f9f4" providerId="ADAL" clId="{D4F8EDFF-8D22-436F-92E2-C640653DB82F}" dt="2023-10-12T18:30:30.135" v="1335" actId="20577"/>
           <ac:graphicFrameMkLst>
             <pc:docMk/>
             <pc:sldMk cId="141755162" sldId="262"/>
@@ -1594,6 +1595,53 @@
             <ac:cxnSpMk id="49" creationId="{E47DC78C-4344-43CB-C9D5-E58F8E67DCE2}"/>
           </ac:cxnSpMkLst>
         </pc:cxnChg>
+      </pc:sldChg>
+      <pc:sldChg chg="addSp delSp modSp add mod ord">
+        <pc:chgData name="Maldonado, Daniel" userId="208bc5cf-4c7f-40de-aa5f-36b84b85f9f4" providerId="ADAL" clId="{D4F8EDFF-8D22-436F-92E2-C640653DB82F}" dt="2023-10-12T18:13:23.514" v="1285"/>
+        <pc:sldMkLst>
+          <pc:docMk/>
+          <pc:sldMk cId="1966457589" sldId="264"/>
+        </pc:sldMkLst>
+        <pc:spChg chg="del">
+          <ac:chgData name="Maldonado, Daniel" userId="208bc5cf-4c7f-40de-aa5f-36b84b85f9f4" providerId="ADAL" clId="{D4F8EDFF-8D22-436F-92E2-C640653DB82F}" dt="2023-10-12T18:12:37.176" v="1280" actId="478"/>
+          <ac:spMkLst>
+            <pc:docMk/>
+            <pc:sldMk cId="1966457589" sldId="264"/>
+            <ac:spMk id="2" creationId="{BBCB7B3B-3DFE-0AB1-C1AD-AB7AC91239CF}"/>
+          </ac:spMkLst>
+        </pc:spChg>
+        <pc:spChg chg="del">
+          <ac:chgData name="Maldonado, Daniel" userId="208bc5cf-4c7f-40de-aa5f-36b84b85f9f4" providerId="ADAL" clId="{D4F8EDFF-8D22-436F-92E2-C640653DB82F}" dt="2023-10-12T18:12:37.176" v="1280" actId="478"/>
+          <ac:spMkLst>
+            <pc:docMk/>
+            <pc:sldMk cId="1966457589" sldId="264"/>
+            <ac:spMk id="3" creationId="{1509698F-76C9-C05E-ACE4-08226D8762EF}"/>
+          </ac:spMkLst>
+        </pc:spChg>
+        <pc:graphicFrameChg chg="mod modGraphic">
+          <ac:chgData name="Maldonado, Daniel" userId="208bc5cf-4c7f-40de-aa5f-36b84b85f9f4" providerId="ADAL" clId="{D4F8EDFF-8D22-436F-92E2-C640653DB82F}" dt="2023-10-12T18:12:34.396" v="1279" actId="403"/>
+          <ac:graphicFrameMkLst>
+            <pc:docMk/>
+            <pc:sldMk cId="1966457589" sldId="264"/>
+            <ac:graphicFrameMk id="19" creationId="{47DA04BD-D556-E349-F093-088F09954839}"/>
+          </ac:graphicFrameMkLst>
+        </pc:graphicFrameChg>
+        <pc:picChg chg="add mod">
+          <ac:chgData name="Maldonado, Daniel" userId="208bc5cf-4c7f-40de-aa5f-36b84b85f9f4" providerId="ADAL" clId="{D4F8EDFF-8D22-436F-92E2-C640653DB82F}" dt="2023-10-12T18:12:45.622" v="1283" actId="1076"/>
+          <ac:picMkLst>
+            <pc:docMk/>
+            <pc:sldMk cId="1966457589" sldId="264"/>
+            <ac:picMk id="1026" creationId="{08FD82EA-2AC1-DBF7-3225-33B31CF50966}"/>
+          </ac:picMkLst>
+        </pc:picChg>
+        <pc:picChg chg="del">
+          <ac:chgData name="Maldonado, Daniel" userId="208bc5cf-4c7f-40de-aa5f-36b84b85f9f4" providerId="ADAL" clId="{D4F8EDFF-8D22-436F-92E2-C640653DB82F}" dt="2023-10-12T18:12:37.176" v="1280" actId="478"/>
+          <ac:picMkLst>
+            <pc:docMk/>
+            <pc:sldMk cId="1966457589" sldId="264"/>
+            <ac:picMk id="2050" creationId="{A53D8E13-1EA8-4524-2B20-3D254C8E938E}"/>
+          </ac:picMkLst>
+        </pc:picChg>
       </pc:sldChg>
     </pc:docChg>
   </pc:docChgLst>
@@ -1614,7 +1662,7 @@
       <a:p>
         <a:r>
           <a:rPr lang="en-US"/>
-          <a:t>Or by range of dates</a:t>
+          <a:t>Or by range of months</a:t>
         </a:r>
       </a:p>
     </p188:txBody>
@@ -4493,6 +4541,177 @@
       </p:grpSpPr>
       <p:graphicFrame>
         <p:nvGraphicFramePr>
+          <p:cNvPr id="19" name="Table 18">
+            <a:extLst>
+              <a:ext uri="{FF2B5EF4-FFF2-40B4-BE49-F238E27FC236}">
+                <a16:creationId xmlns:a16="http://schemas.microsoft.com/office/drawing/2014/main" id="{47DA04BD-D556-E349-F093-088F09954839}"/>
+              </a:ext>
+            </a:extLst>
+          </p:cNvPr>
+          <p:cNvGraphicFramePr>
+            <a:graphicFrameLocks noGrp="1"/>
+          </p:cNvGraphicFramePr>
+          <p:nvPr>
+            <p:extLst>
+              <p:ext uri="{D42A27DB-BD31-4B8C-83A1-F6EECF244321}">
+                <p14:modId xmlns:p14="http://schemas.microsoft.com/office/powerpoint/2010/main" val="1675367439"/>
+              </p:ext>
+            </p:extLst>
+          </p:nvPr>
+        </p:nvGraphicFramePr>
+        <p:xfrm>
+          <a:off x="0" y="411183"/>
+          <a:ext cx="12191999" cy="457200"/>
+        </p:xfrm>
+        <a:graphic>
+          <a:graphicData uri="http://schemas.openxmlformats.org/drawingml/2006/table">
+            <a:tbl>
+              <a:tblPr firstRow="1" bandRow="1">
+                <a:tableStyleId>{5C22544A-7EE6-4342-B048-85BDC9FD1C3A}</a:tableStyleId>
+              </a:tblPr>
+              <a:tblGrid>
+                <a:gridCol w="12191999">
+                  <a:extLst>
+                    <a:ext uri="{9D8B030D-6E8A-4147-A177-3AD203B41FA5}">
+                      <a16:colId xmlns:a16="http://schemas.microsoft.com/office/drawing/2014/main" val="864389183"/>
+                    </a:ext>
+                  </a:extLst>
+                </a:gridCol>
+              </a:tblGrid>
+              <a:tr h="370840">
+                <a:tc>
+                  <a:txBody>
+                    <a:bodyPr/>
+                    <a:lstStyle/>
+                    <a:p>
+                      <a:pPr algn="ctr"/>
+                      <a:r>
+                        <a:rPr lang="en-US" sz="2400" noProof="0" dirty="0"/>
+                        <a:t>Personal Finances App</a:t>
+                      </a:r>
+                    </a:p>
+                  </a:txBody>
+                  <a:tcPr>
+                    <a:lnL w="12700" cmpd="sng">
+                      <a:noFill/>
+                    </a:lnL>
+                    <a:lnR w="12700" cmpd="sng">
+                      <a:noFill/>
+                    </a:lnR>
+                    <a:lnT w="12700" cmpd="sng">
+                      <a:noFill/>
+                    </a:lnT>
+                    <a:lnB w="38100" cmpd="sng">
+                      <a:noFill/>
+                    </a:lnB>
+                    <a:lnTlToBr w="12700" cmpd="sng">
+                      <a:noFill/>
+                      <a:prstDash val="solid"/>
+                    </a:lnTlToBr>
+                    <a:lnBlToTr w="12700" cmpd="sng">
+                      <a:noFill/>
+                      <a:prstDash val="solid"/>
+                    </a:lnBlToTr>
+                    <a:noFill/>
+                  </a:tcPr>
+                </a:tc>
+                <a:extLst>
+                  <a:ext uri="{0D108BD9-81ED-4DB2-BD59-A6C34878D82A}">
+                    <a16:rowId xmlns:a16="http://schemas.microsoft.com/office/drawing/2014/main" val="2679203274"/>
+                  </a:ext>
+                </a:extLst>
+              </a:tr>
+            </a:tbl>
+          </a:graphicData>
+        </a:graphic>
+      </p:graphicFrame>
+      <p:pic>
+        <p:nvPicPr>
+          <p:cNvPr id="1026" name="Picture 2" descr="Google Login with Angular 15. In this article, we are going to… | by Atakan  Korez | Medium">
+            <a:extLst>
+              <a:ext uri="{FF2B5EF4-FFF2-40B4-BE49-F238E27FC236}">
+                <a16:creationId xmlns:a16="http://schemas.microsoft.com/office/drawing/2014/main" id="{08FD82EA-2AC1-DBF7-3225-33B31CF50966}"/>
+              </a:ext>
+            </a:extLst>
+          </p:cNvPr>
+          <p:cNvPicPr>
+            <a:picLocks noChangeAspect="1" noChangeArrowheads="1"/>
+          </p:cNvPicPr>
+          <p:nvPr/>
+        </p:nvPicPr>
+        <p:blipFill>
+          <a:blip r:embed="rId2">
+            <a:extLst>
+              <a:ext uri="{28A0092B-C50C-407E-A947-70E740481C1C}">
+                <a14:useLocalDpi xmlns:a14="http://schemas.microsoft.com/office/drawing/2010/main" val="0"/>
+              </a:ext>
+            </a:extLst>
+          </a:blip>
+          <a:srcRect/>
+          <a:stretch>
+            <a:fillRect/>
+          </a:stretch>
+        </p:blipFill>
+        <p:spPr bwMode="auto">
+          <a:xfrm>
+            <a:off x="4763477" y="3090664"/>
+            <a:ext cx="2665046" cy="676672"/>
+          </a:xfrm>
+          <a:prstGeom prst="rect">
+            <a:avLst/>
+          </a:prstGeom>
+          <a:noFill/>
+          <a:extLst>
+            <a:ext uri="{909E8E84-426E-40DD-AFC4-6F175D3DCCD1}">
+              <a14:hiddenFill xmlns:a14="http://schemas.microsoft.com/office/drawing/2010/main">
+                <a:solidFill>
+                  <a:srgbClr val="FFFFFF"/>
+                </a:solidFill>
+              </a14:hiddenFill>
+            </a:ext>
+          </a:extLst>
+        </p:spPr>
+      </p:pic>
+    </p:spTree>
+    <p:extLst>
+      <p:ext uri="{BB962C8B-B14F-4D97-AF65-F5344CB8AC3E}">
+        <p14:creationId xmlns:p14="http://schemas.microsoft.com/office/powerpoint/2010/main" val="1966457589"/>
+      </p:ext>
+    </p:extLst>
+  </p:cSld>
+  <p:clrMapOvr>
+    <a:masterClrMapping/>
+  </p:clrMapOvr>
+</p:sld>
+</file>
+
+<file path=ppt/slides/slide2.xml><?xml version="1.0" encoding="utf-8"?>
+<p:sld xmlns:a="http://schemas.openxmlformats.org/drawingml/2006/main" xmlns:r="http://schemas.openxmlformats.org/officeDocument/2006/relationships" xmlns:p="http://schemas.openxmlformats.org/presentationml/2006/main">
+  <p:cSld>
+    <p:bg>
+      <p:bgPr>
+        <a:solidFill>
+          <a:srgbClr val="212529"/>
+        </a:solidFill>
+        <a:effectLst/>
+      </p:bgPr>
+    </p:bg>
+    <p:spTree>
+      <p:nvGrpSpPr>
+        <p:cNvPr id="1" name=""/>
+        <p:cNvGrpSpPr/>
+        <p:nvPr/>
+      </p:nvGrpSpPr>
+      <p:grpSpPr>
+        <a:xfrm>
+          <a:off x="0" y="0"/>
+          <a:ext cx="0" cy="0"/>
+          <a:chOff x="0" y="0"/>
+          <a:chExt cx="0" cy="0"/>
+        </a:xfrm>
+      </p:grpSpPr>
+      <p:graphicFrame>
+        <p:nvGraphicFramePr>
           <p:cNvPr id="6" name="Table 5">
             <a:extLst>
               <a:ext uri="{FF2B5EF4-FFF2-40B4-BE49-F238E27FC236}">
@@ -5221,7 +5440,7 @@
 </p:sld>
 </file>
 
-<file path=ppt/slides/slide2.xml><?xml version="1.0" encoding="utf-8"?>
+<file path=ppt/slides/slide3.xml><?xml version="1.0" encoding="utf-8"?>
 <p:sld xmlns:a="http://schemas.openxmlformats.org/drawingml/2006/main" xmlns:r="http://schemas.openxmlformats.org/officeDocument/2006/relationships" xmlns:p="http://schemas.openxmlformats.org/presentationml/2006/main">
   <p:cSld>
     <p:bg>
@@ -5261,7 +5480,7 @@
           <p:nvPr>
             <p:extLst>
               <p:ext uri="{D42A27DB-BD31-4B8C-83A1-F6EECF244321}">
-                <p14:modId xmlns:p14="http://schemas.microsoft.com/office/powerpoint/2010/main" val="461829298"/>
+                <p14:modId xmlns:p14="http://schemas.microsoft.com/office/powerpoint/2010/main" val="2740745858"/>
               </p:ext>
             </p:extLst>
           </p:nvPr>
@@ -5357,7 +5576,7 @@
                             <a:schemeClr val="tx1"/>
                           </a:solidFill>
                         </a:rPr>
-                        <a:t>Goal</a:t>
+                        <a:t>Limit</a:t>
                       </a:r>
                     </a:p>
                   </a:txBody>
@@ -7213,7 +7432,7 @@
 </p:sld>
 </file>
 
-<file path=ppt/slides/slide3.xml><?xml version="1.0" encoding="utf-8"?>
+<file path=ppt/slides/slide4.xml><?xml version="1.0" encoding="utf-8"?>
 <p:sld xmlns:a="http://schemas.openxmlformats.org/drawingml/2006/main" xmlns:r="http://schemas.openxmlformats.org/officeDocument/2006/relationships" xmlns:p="http://schemas.openxmlformats.org/presentationml/2006/main">
   <p:cSld>
     <p:bg>
@@ -7253,7 +7472,7 @@
           <p:nvPr>
             <p:extLst>
               <p:ext uri="{D42A27DB-BD31-4B8C-83A1-F6EECF244321}">
-                <p14:modId xmlns:p14="http://schemas.microsoft.com/office/powerpoint/2010/main" val="2112031212"/>
+                <p14:modId xmlns:p14="http://schemas.microsoft.com/office/powerpoint/2010/main" val="241210325"/>
               </p:ext>
             </p:extLst>
           </p:nvPr>
@@ -7310,7 +7529,7 @@
                             <a:schemeClr val="tx1"/>
                           </a:solidFill>
                         </a:rPr>
-                        <a:t>Category</a:t>
+                        <a:t>Saving</a:t>
                       </a:r>
                     </a:p>
                   </a:txBody>
@@ -7349,7 +7568,7 @@
                             <a:schemeClr val="tx1"/>
                           </a:solidFill>
                         </a:rPr>
-                        <a:t>Goal</a:t>
+                        <a:t>Target</a:t>
                       </a:r>
                     </a:p>
                   </a:txBody>
@@ -8940,7 +9159,7 @@
 </p:sld>
 </file>
 
-<file path=ppt/slides/slide4.xml><?xml version="1.0" encoding="utf-8"?>
+<file path=ppt/slides/slide5.xml><?xml version="1.0" encoding="utf-8"?>
 <p:sld xmlns:a="http://schemas.openxmlformats.org/drawingml/2006/main" xmlns:r="http://schemas.openxmlformats.org/officeDocument/2006/relationships" xmlns:p="http://schemas.openxmlformats.org/presentationml/2006/main">
   <p:cSld>
     <p:bg>
@@ -8980,7 +9199,7 @@
           <p:nvPr>
             <p:extLst>
               <p:ext uri="{D42A27DB-BD31-4B8C-83A1-F6EECF244321}">
-                <p14:modId xmlns:p14="http://schemas.microsoft.com/office/powerpoint/2010/main" val="1489057321"/>
+                <p14:modId xmlns:p14="http://schemas.microsoft.com/office/powerpoint/2010/main" val="479873309"/>
               </p:ext>
             </p:extLst>
           </p:nvPr>
@@ -9037,7 +9256,7 @@
                             <a:schemeClr val="tx1"/>
                           </a:solidFill>
                         </a:rPr>
-                        <a:t>Category</a:t>
+                        <a:t>Payment</a:t>
                       </a:r>
                     </a:p>
                   </a:txBody>
@@ -9076,7 +9295,7 @@
                             <a:schemeClr val="tx1"/>
                           </a:solidFill>
                         </a:rPr>
-                        <a:t>Goal</a:t>
+                        <a:t>Amount</a:t>
                       </a:r>
                     </a:p>
                   </a:txBody>
@@ -9124,7 +9343,7 @@
                             <a:schemeClr val="tx1"/>
                           </a:solidFill>
                         </a:rPr>
-                        <a:t>Spent</a:t>
+                        <a:t>Paid</a:t>
                       </a:r>
                     </a:p>
                   </a:txBody>
@@ -9167,12 +9386,12 @@
                     <a:lstStyle/>
                     <a:p>
                       <a:r>
-                        <a:rPr lang="es-ES" noProof="0" dirty="0">
+                        <a:rPr lang="es-ES" noProof="0" dirty="0" err="1">
                           <a:solidFill>
                             <a:schemeClr val="tx1"/>
                           </a:solidFill>
                         </a:rPr>
-                        <a:t>Total</a:t>
+                        <a:t>Missing</a:t>
                       </a:r>
                       <a:endParaRPr lang="en-US" noProof="0" dirty="0">
                         <a:solidFill>
@@ -11067,7 +11286,7 @@
 </p:sld>
 </file>
 
-<file path=ppt/slides/slide5.xml><?xml version="1.0" encoding="utf-8"?>
+<file path=ppt/slides/slide6.xml><?xml version="1.0" encoding="utf-8"?>
 <p:sld xmlns:a="http://schemas.openxmlformats.org/drawingml/2006/main" xmlns:r="http://schemas.openxmlformats.org/officeDocument/2006/relationships" xmlns:p="http://schemas.openxmlformats.org/presentationml/2006/main">
   <p:cSld>
     <p:bg>
@@ -12496,7 +12715,7 @@
         <p:spPr>
           <a:xfrm>
             <a:off x="5623088" y="5324940"/>
-            <a:ext cx="5656082" cy="1077218"/>
+            <a:ext cx="5656082" cy="1323439"/>
           </a:xfrm>
           <a:prstGeom prst="rect">
             <a:avLst/>
@@ -12519,19 +12738,21 @@
             <a:pPr algn="ctr"/>
             <a:r>
               <a:rPr lang="en-US" sz="1600" i="1" dirty="0"/>
-              <a:t>- </a:t>
+              <a:t>- Have a summary by week table</a:t>
             </a:r>
-            <a:r>
-              <a:rPr lang="en-US" sz="1600" i="1"/>
-              <a:t>Have a summary by week table</a:t>
-            </a:r>
-            <a:endParaRPr lang="en-US" sz="1600" i="1" dirty="0"/>
           </a:p>
           <a:p>
             <a:pPr algn="ctr"/>
             <a:r>
               <a:rPr lang="en-US" sz="1600" i="1" dirty="0"/>
               <a:t>- Include graphs like the ones in the image</a:t>
+            </a:r>
+          </a:p>
+          <a:p>
+            <a:pPr algn="ctr"/>
+            <a:r>
+              <a:rPr lang="en-US" sz="1600" i="1" dirty="0"/>
+              <a:t>- Download CSV file of the information</a:t>
             </a:r>
           </a:p>
         </p:txBody>
@@ -13157,7 +13378,7 @@
 </p:sld>
 </file>
 
-<file path=ppt/slides/slide6.xml><?xml version="1.0" encoding="utf-8"?>
+<file path=ppt/slides/slide7.xml><?xml version="1.0" encoding="utf-8"?>
 <p:sld xmlns:a="http://schemas.openxmlformats.org/drawingml/2006/main" xmlns:r="http://schemas.openxmlformats.org/officeDocument/2006/relationships" xmlns:p="http://schemas.openxmlformats.org/presentationml/2006/main">
   <p:cSld>
     <p:bg>

</xml_diff>